<commit_message>
maybe going nuts, but Luna made it into the presentation
</commit_message>
<xml_diff>
--- a/PalMod2022/docs/choose_blocks.pptx
+++ b/PalMod2022/docs/choose_blocks.pptx
@@ -245,7 +245,7 @@
           <a:p>
             <a:fld id="{6A96EA6E-A9F3-40C8-A047-16E35C64F658}" type="datetimeFigureOut">
               <a:rPr lang="tr-TR" smtClean="0"/>
-              <a:t>14.04.2022</a:t>
+              <a:t>15.04.2022</a:t>
             </a:fld>
             <a:endParaRPr lang="tr-TR"/>
           </a:p>
@@ -415,7 +415,7 @@
           <a:p>
             <a:fld id="{6A96EA6E-A9F3-40C8-A047-16E35C64F658}" type="datetimeFigureOut">
               <a:rPr lang="tr-TR" smtClean="0"/>
-              <a:t>14.04.2022</a:t>
+              <a:t>15.04.2022</a:t>
             </a:fld>
             <a:endParaRPr lang="tr-TR"/>
           </a:p>
@@ -595,7 +595,7 @@
           <a:p>
             <a:fld id="{6A96EA6E-A9F3-40C8-A047-16E35C64F658}" type="datetimeFigureOut">
               <a:rPr lang="tr-TR" smtClean="0"/>
-              <a:t>14.04.2022</a:t>
+              <a:t>15.04.2022</a:t>
             </a:fld>
             <a:endParaRPr lang="tr-TR"/>
           </a:p>
@@ -765,7 +765,7 @@
           <a:p>
             <a:fld id="{6A96EA6E-A9F3-40C8-A047-16E35C64F658}" type="datetimeFigureOut">
               <a:rPr lang="tr-TR" smtClean="0"/>
-              <a:t>14.04.2022</a:t>
+              <a:t>15.04.2022</a:t>
             </a:fld>
             <a:endParaRPr lang="tr-TR"/>
           </a:p>
@@ -1011,7 +1011,7 @@
           <a:p>
             <a:fld id="{6A96EA6E-A9F3-40C8-A047-16E35C64F658}" type="datetimeFigureOut">
               <a:rPr lang="tr-TR" smtClean="0"/>
-              <a:t>14.04.2022</a:t>
+              <a:t>15.04.2022</a:t>
             </a:fld>
             <a:endParaRPr lang="tr-TR"/>
           </a:p>
@@ -1243,7 +1243,7 @@
           <a:p>
             <a:fld id="{6A96EA6E-A9F3-40C8-A047-16E35C64F658}" type="datetimeFigureOut">
               <a:rPr lang="tr-TR" smtClean="0"/>
-              <a:t>14.04.2022</a:t>
+              <a:t>15.04.2022</a:t>
             </a:fld>
             <a:endParaRPr lang="tr-TR"/>
           </a:p>
@@ -1610,7 +1610,7 @@
           <a:p>
             <a:fld id="{6A96EA6E-A9F3-40C8-A047-16E35C64F658}" type="datetimeFigureOut">
               <a:rPr lang="tr-TR" smtClean="0"/>
-              <a:t>14.04.2022</a:t>
+              <a:t>15.04.2022</a:t>
             </a:fld>
             <a:endParaRPr lang="tr-TR"/>
           </a:p>
@@ -1728,7 +1728,7 @@
           <a:p>
             <a:fld id="{6A96EA6E-A9F3-40C8-A047-16E35C64F658}" type="datetimeFigureOut">
               <a:rPr lang="tr-TR" smtClean="0"/>
-              <a:t>14.04.2022</a:t>
+              <a:t>15.04.2022</a:t>
             </a:fld>
             <a:endParaRPr lang="tr-TR"/>
           </a:p>
@@ -1823,7 +1823,7 @@
           <a:p>
             <a:fld id="{6A96EA6E-A9F3-40C8-A047-16E35C64F658}" type="datetimeFigureOut">
               <a:rPr lang="tr-TR" smtClean="0"/>
-              <a:t>14.04.2022</a:t>
+              <a:t>15.04.2022</a:t>
             </a:fld>
             <a:endParaRPr lang="tr-TR"/>
           </a:p>
@@ -2100,7 +2100,7 @@
           <a:p>
             <a:fld id="{6A96EA6E-A9F3-40C8-A047-16E35C64F658}" type="datetimeFigureOut">
               <a:rPr lang="tr-TR" smtClean="0"/>
-              <a:t>14.04.2022</a:t>
+              <a:t>15.04.2022</a:t>
             </a:fld>
             <a:endParaRPr lang="tr-TR"/>
           </a:p>
@@ -2353,7 +2353,7 @@
           <a:p>
             <a:fld id="{6A96EA6E-A9F3-40C8-A047-16E35C64F658}" type="datetimeFigureOut">
               <a:rPr lang="tr-TR" smtClean="0"/>
-              <a:t>14.04.2022</a:t>
+              <a:t>15.04.2022</a:t>
             </a:fld>
             <a:endParaRPr lang="tr-TR"/>
           </a:p>
@@ -2566,7 +2566,7 @@
           <a:p>
             <a:fld id="{6A96EA6E-A9F3-40C8-A047-16E35C64F658}" type="datetimeFigureOut">
               <a:rPr lang="tr-TR" smtClean="0"/>
-              <a:t>14.04.2022</a:t>
+              <a:t>15.04.2022</a:t>
             </a:fld>
             <a:endParaRPr lang="tr-TR"/>
           </a:p>
@@ -5734,6 +5734,146 @@
           </a:fontRef>
         </p:style>
       </p:cxnSp>
+      <p:grpSp>
+        <p:nvGrpSpPr>
+          <p:cNvPr id="18" name="Group 17">
+            <a:extLst>
+              <a:ext uri="{FF2B5EF4-FFF2-40B4-BE49-F238E27FC236}">
+                <a16:creationId xmlns:a16="http://schemas.microsoft.com/office/drawing/2014/main" id="{6B0D20F0-710E-83AF-9AAA-027653BAA425}"/>
+              </a:ext>
+            </a:extLst>
+          </p:cNvPr>
+          <p:cNvGrpSpPr/>
+          <p:nvPr/>
+        </p:nvGrpSpPr>
+        <p:grpSpPr>
+          <a:xfrm>
+            <a:off x="6394171" y="592133"/>
+            <a:ext cx="6167337" cy="2142386"/>
+            <a:chOff x="6394171" y="592133"/>
+            <a:chExt cx="6167337" cy="2142386"/>
+          </a:xfrm>
+        </p:grpSpPr>
+        <p:pic>
+          <p:nvPicPr>
+            <p:cNvPr id="5" name="Picture 4">
+              <a:extLst>
+                <a:ext uri="{FF2B5EF4-FFF2-40B4-BE49-F238E27FC236}">
+                  <a16:creationId xmlns:a16="http://schemas.microsoft.com/office/drawing/2014/main" id="{698AE497-E2FB-86D2-ED07-D1D1092FF79D}"/>
+                </a:ext>
+              </a:extLst>
+            </p:cNvPr>
+            <p:cNvPicPr>
+              <a:picLocks noChangeAspect="1"/>
+            </p:cNvPicPr>
+            <p:nvPr/>
+          </p:nvPicPr>
+          <p:blipFill>
+            <a:blip r:embed="rId2">
+              <a:extLst>
+                <a:ext uri="{28A0092B-C50C-407E-A947-70E740481C1C}">
+                  <a14:useLocalDpi xmlns:a14="http://schemas.microsoft.com/office/drawing/2010/main" val="0"/>
+                </a:ext>
+              </a:extLst>
+            </a:blip>
+            <a:stretch>
+              <a:fillRect/>
+            </a:stretch>
+          </p:blipFill>
+          <p:spPr>
+            <a:xfrm>
+              <a:off x="6394171" y="1592853"/>
+              <a:ext cx="1141666" cy="1141666"/>
+            </a:xfrm>
+            <a:prstGeom prst="ellipse">
+              <a:avLst/>
+            </a:prstGeom>
+            <a:solidFill>
+              <a:schemeClr val="bg1"/>
+            </a:solidFill>
+          </p:spPr>
+        </p:pic>
+        <p:sp>
+          <p:nvSpPr>
+            <p:cNvPr id="8" name="Oval Callout 7">
+              <a:extLst>
+                <a:ext uri="{FF2B5EF4-FFF2-40B4-BE49-F238E27FC236}">
+                  <a16:creationId xmlns:a16="http://schemas.microsoft.com/office/drawing/2014/main" id="{F9CAB988-03AF-B287-ECCB-5A1FCE8FA94D}"/>
+                </a:ext>
+              </a:extLst>
+            </p:cNvPr>
+            <p:cNvSpPr/>
+            <p:nvPr/>
+          </p:nvSpPr>
+          <p:spPr>
+            <a:xfrm>
+              <a:off x="7412477" y="592133"/>
+              <a:ext cx="5149031" cy="1408465"/>
+            </a:xfrm>
+            <a:prstGeom prst="wedgeEllipseCallout">
+              <a:avLst>
+                <a:gd name="adj1" fmla="val -44496"/>
+                <a:gd name="adj2" fmla="val 56060"/>
+              </a:avLst>
+            </a:prstGeom>
+            <a:solidFill>
+              <a:schemeClr val="bg1"/>
+            </a:solidFill>
+            <a:ln>
+              <a:solidFill>
+                <a:schemeClr val="tx1"/>
+              </a:solidFill>
+            </a:ln>
+          </p:spPr>
+          <p:style>
+            <a:lnRef idx="2">
+              <a:schemeClr val="accent1">
+                <a:shade val="50000"/>
+              </a:schemeClr>
+            </a:lnRef>
+            <a:fillRef idx="1">
+              <a:schemeClr val="accent1"/>
+            </a:fillRef>
+            <a:effectRef idx="0">
+              <a:schemeClr val="accent1"/>
+            </a:effectRef>
+            <a:fontRef idx="minor">
+              <a:schemeClr val="lt1"/>
+            </a:fontRef>
+          </p:style>
+          <p:txBody>
+            <a:bodyPr rtlCol="0" anchor="ctr"/>
+            <a:lstStyle/>
+            <a:p>
+              <a:pPr algn="ctr"/>
+              <a:r>
+                <a:rPr lang="en-GB" dirty="0">
+                  <a:solidFill>
+                    <a:schemeClr val="tx1"/>
+                  </a:solidFill>
+                </a:rPr>
+                <a:t>There are very good use-case examples in the </a:t>
+              </a:r>
+              <a:r>
+                <a:rPr lang="en-GB" dirty="0" err="1">
+                  <a:solidFill>
+                    <a:schemeClr val="tx1"/>
+                  </a:solidFill>
+                </a:rPr>
+                <a:t>awiesm.yaml</a:t>
+              </a:r>
+              <a:r>
+                <a:rPr lang="en-GB" dirty="0">
+                  <a:solidFill>
+                    <a:schemeClr val="tx1"/>
+                  </a:solidFill>
+                </a:rPr>
+                <a:t>, the instructors will show those after the hands-on exercise</a:t>
+              </a:r>
+            </a:p>
+          </p:txBody>
+        </p:sp>
+      </p:grpSp>
     </p:spTree>
     <p:extLst>
       <p:ext uri="{BB962C8B-B14F-4D97-AF65-F5344CB8AC3E}">

</xml_diff>